<commit_message>
changes to results, intro, gd
</commit_message>
<xml_diff>
--- a/writing/cogsci/figures/figures.pptx
+++ b/writing/cogsci/figures/figures.pptx
@@ -291,7 +291,7 @@
             <a:fld id="{777364C6-8202-CF4E-AE28-F11CA5C212C9}" type="datetimeFigureOut">
               <a:rPr lang="en-US" smtClean="0"/>
               <a:pPr/>
-              <a:t>1/22/16</a:t>
+              <a:t>1/30/16</a:t>
             </a:fld>
             <a:endParaRPr lang="en-US"/>
           </a:p>
@@ -458,7 +458,7 @@
             <a:fld id="{777364C6-8202-CF4E-AE28-F11CA5C212C9}" type="datetimeFigureOut">
               <a:rPr lang="en-US" smtClean="0"/>
               <a:pPr/>
-              <a:t>1/22/16</a:t>
+              <a:t>1/30/16</a:t>
             </a:fld>
             <a:endParaRPr lang="en-US"/>
           </a:p>
@@ -635,7 +635,7 @@
             <a:fld id="{777364C6-8202-CF4E-AE28-F11CA5C212C9}" type="datetimeFigureOut">
               <a:rPr lang="en-US" smtClean="0"/>
               <a:pPr/>
-              <a:t>1/22/16</a:t>
+              <a:t>1/30/16</a:t>
             </a:fld>
             <a:endParaRPr lang="en-US"/>
           </a:p>
@@ -802,7 +802,7 @@
             <a:fld id="{777364C6-8202-CF4E-AE28-F11CA5C212C9}" type="datetimeFigureOut">
               <a:rPr lang="en-US" smtClean="0"/>
               <a:pPr/>
-              <a:t>1/22/16</a:t>
+              <a:t>1/30/16</a:t>
             </a:fld>
             <a:endParaRPr lang="en-US"/>
           </a:p>
@@ -1045,7 +1045,7 @@
             <a:fld id="{777364C6-8202-CF4E-AE28-F11CA5C212C9}" type="datetimeFigureOut">
               <a:rPr lang="en-US" smtClean="0"/>
               <a:pPr/>
-              <a:t>1/22/16</a:t>
+              <a:t>1/30/16</a:t>
             </a:fld>
             <a:endParaRPr lang="en-US"/>
           </a:p>
@@ -1330,7 +1330,7 @@
             <a:fld id="{777364C6-8202-CF4E-AE28-F11CA5C212C9}" type="datetimeFigureOut">
               <a:rPr lang="en-US" smtClean="0"/>
               <a:pPr/>
-              <a:t>1/22/16</a:t>
+              <a:t>1/30/16</a:t>
             </a:fld>
             <a:endParaRPr lang="en-US"/>
           </a:p>
@@ -1749,7 +1749,7 @@
             <a:fld id="{777364C6-8202-CF4E-AE28-F11CA5C212C9}" type="datetimeFigureOut">
               <a:rPr lang="en-US" smtClean="0"/>
               <a:pPr/>
-              <a:t>1/22/16</a:t>
+              <a:t>1/30/16</a:t>
             </a:fld>
             <a:endParaRPr lang="en-US"/>
           </a:p>
@@ -1864,7 +1864,7 @@
             <a:fld id="{777364C6-8202-CF4E-AE28-F11CA5C212C9}" type="datetimeFigureOut">
               <a:rPr lang="en-US" smtClean="0"/>
               <a:pPr/>
-              <a:t>1/22/16</a:t>
+              <a:t>1/30/16</a:t>
             </a:fld>
             <a:endParaRPr lang="en-US"/>
           </a:p>
@@ -1956,7 +1956,7 @@
             <a:fld id="{777364C6-8202-CF4E-AE28-F11CA5C212C9}" type="datetimeFigureOut">
               <a:rPr lang="en-US" smtClean="0"/>
               <a:pPr/>
-              <a:t>1/22/16</a:t>
+              <a:t>1/30/16</a:t>
             </a:fld>
             <a:endParaRPr lang="en-US"/>
           </a:p>
@@ -2230,7 +2230,7 @@
             <a:fld id="{777364C6-8202-CF4E-AE28-F11CA5C212C9}" type="datetimeFigureOut">
               <a:rPr lang="en-US" smtClean="0"/>
               <a:pPr/>
-              <a:t>1/22/16</a:t>
+              <a:t>1/30/16</a:t>
             </a:fld>
             <a:endParaRPr lang="en-US"/>
           </a:p>
@@ -2480,7 +2480,7 @@
             <a:fld id="{777364C6-8202-CF4E-AE28-F11CA5C212C9}" type="datetimeFigureOut">
               <a:rPr lang="en-US" smtClean="0"/>
               <a:pPr/>
-              <a:t>1/22/16</a:t>
+              <a:t>1/30/16</a:t>
             </a:fld>
             <a:endParaRPr lang="en-US"/>
           </a:p>
@@ -2690,7 +2690,7 @@
             <a:fld id="{777364C6-8202-CF4E-AE28-F11CA5C212C9}" type="datetimeFigureOut">
               <a:rPr lang="en-US" smtClean="0"/>
               <a:pPr/>
-              <a:t>1/22/16</a:t>
+              <a:t>1/30/16</a:t>
             </a:fld>
             <a:endParaRPr lang="en-US"/>
           </a:p>
@@ -3061,9 +3061,238 @@
           <a:chExt cx="0" cy="0"/>
         </a:xfrm>
       </p:grpSpPr>
+      <p:sp>
+        <p:nvSpPr>
+          <p:cNvPr id="6" name="TextBox 5"/>
+          <p:cNvSpPr txBox="1"/>
+          <p:nvPr/>
+        </p:nvSpPr>
+        <p:spPr>
+          <a:xfrm>
+            <a:off x="1857784" y="1039373"/>
+            <a:ext cx="1255948" cy="307777"/>
+          </a:xfrm>
+          <a:prstGeom prst="rect">
+            <a:avLst/>
+          </a:prstGeom>
+          <a:noFill/>
+        </p:spPr>
+        <p:txBody>
+          <a:bodyPr wrap="square" rtlCol="0">
+            <a:spAutoFit/>
+          </a:bodyPr>
+          <a:lstStyle/>
+          <a:p>
+            <a:pPr algn="ctr"/>
+            <a:r>
+              <a:rPr lang="en-US" sz="1400" b="1" dirty="0" smtClean="0">
+                <a:latin typeface="Helvetica"/>
+                <a:cs typeface="Helvetica"/>
+              </a:rPr>
+              <a:t>4-year-olds</a:t>
+            </a:r>
+            <a:endParaRPr lang="en-US" sz="1400" b="1" dirty="0">
+              <a:latin typeface="Helvetica"/>
+              <a:cs typeface="Helvetica"/>
+            </a:endParaRPr>
+          </a:p>
+        </p:txBody>
+      </p:sp>
+      <p:sp>
+        <p:nvSpPr>
+          <p:cNvPr id="8" name="TextBox 7"/>
+          <p:cNvSpPr txBox="1"/>
+          <p:nvPr/>
+        </p:nvSpPr>
+        <p:spPr>
+          <a:xfrm>
+            <a:off x="3780031" y="1039373"/>
+            <a:ext cx="1255948" cy="307777"/>
+          </a:xfrm>
+          <a:prstGeom prst="rect">
+            <a:avLst/>
+          </a:prstGeom>
+          <a:noFill/>
+        </p:spPr>
+        <p:txBody>
+          <a:bodyPr wrap="square" rtlCol="0">
+            <a:spAutoFit/>
+          </a:bodyPr>
+          <a:lstStyle/>
+          <a:p>
+            <a:pPr algn="ctr"/>
+            <a:r>
+              <a:rPr lang="en-US" sz="1400" b="1" dirty="0" smtClean="0">
+                <a:latin typeface="Helvetica"/>
+                <a:cs typeface="Helvetica"/>
+              </a:rPr>
+              <a:t>5-year-olds</a:t>
+            </a:r>
+            <a:endParaRPr lang="en-US" sz="1400" b="1" dirty="0">
+              <a:latin typeface="Helvetica"/>
+              <a:cs typeface="Helvetica"/>
+            </a:endParaRPr>
+          </a:p>
+        </p:txBody>
+      </p:sp>
+      <p:sp>
+        <p:nvSpPr>
+          <p:cNvPr id="9" name="TextBox 8"/>
+          <p:cNvSpPr txBox="1"/>
+          <p:nvPr/>
+        </p:nvSpPr>
+        <p:spPr>
+          <a:xfrm>
+            <a:off x="5702278" y="1039373"/>
+            <a:ext cx="1255948" cy="307777"/>
+          </a:xfrm>
+          <a:prstGeom prst="rect">
+            <a:avLst/>
+          </a:prstGeom>
+          <a:noFill/>
+        </p:spPr>
+        <p:txBody>
+          <a:bodyPr wrap="square" rtlCol="0">
+            <a:spAutoFit/>
+          </a:bodyPr>
+          <a:lstStyle/>
+          <a:p>
+            <a:pPr algn="ctr"/>
+            <a:r>
+              <a:rPr lang="en-US" sz="1400" b="1" dirty="0">
+                <a:latin typeface="Helvetica"/>
+                <a:cs typeface="Helvetica"/>
+              </a:rPr>
+              <a:t>6</a:t>
+            </a:r>
+            <a:r>
+              <a:rPr lang="en-US" sz="1400" b="1" dirty="0" smtClean="0">
+                <a:latin typeface="Helvetica"/>
+                <a:cs typeface="Helvetica"/>
+              </a:rPr>
+              <a:t>-year-olds</a:t>
+            </a:r>
+            <a:endParaRPr lang="en-US" sz="1400" b="1" dirty="0">
+              <a:latin typeface="Helvetica"/>
+              <a:cs typeface="Helvetica"/>
+            </a:endParaRPr>
+          </a:p>
+        </p:txBody>
+      </p:sp>
+      <p:sp>
+        <p:nvSpPr>
+          <p:cNvPr id="10" name="TextBox 9"/>
+          <p:cNvSpPr txBox="1"/>
+          <p:nvPr/>
+        </p:nvSpPr>
+        <p:spPr>
+          <a:xfrm>
+            <a:off x="887036" y="1328113"/>
+            <a:ext cx="400110" cy="1274054"/>
+          </a:xfrm>
+          <a:prstGeom prst="rect">
+            <a:avLst/>
+          </a:prstGeom>
+          <a:noFill/>
+        </p:spPr>
+        <p:txBody>
+          <a:bodyPr vert="vert270" wrap="square" rtlCol="0">
+            <a:spAutoFit/>
+          </a:bodyPr>
+          <a:lstStyle/>
+          <a:p>
+            <a:pPr algn="ctr"/>
+            <a:r>
+              <a:rPr lang="en-US" sz="1400" b="1" dirty="0" smtClean="0">
+                <a:latin typeface="Helvetica"/>
+                <a:cs typeface="Helvetica"/>
+              </a:rPr>
+              <a:t>Inhibition</a:t>
+            </a:r>
+            <a:endParaRPr lang="en-US" sz="1400" b="1" dirty="0">
+              <a:latin typeface="Helvetica"/>
+              <a:cs typeface="Helvetica"/>
+            </a:endParaRPr>
+          </a:p>
+        </p:txBody>
+      </p:sp>
+      <p:sp>
+        <p:nvSpPr>
+          <p:cNvPr id="11" name="TextBox 10"/>
+          <p:cNvSpPr txBox="1"/>
+          <p:nvPr/>
+        </p:nvSpPr>
+        <p:spPr>
+          <a:xfrm>
+            <a:off x="887036" y="2950854"/>
+            <a:ext cx="400110" cy="1274054"/>
+          </a:xfrm>
+          <a:prstGeom prst="rect">
+            <a:avLst/>
+          </a:prstGeom>
+          <a:noFill/>
+        </p:spPr>
+        <p:txBody>
+          <a:bodyPr vert="vert270" wrap="square" rtlCol="0">
+            <a:spAutoFit/>
+          </a:bodyPr>
+          <a:lstStyle/>
+          <a:p>
+            <a:pPr algn="ctr"/>
+            <a:r>
+              <a:rPr lang="en-US" sz="1400" b="1" dirty="0" err="1" smtClean="0">
+                <a:latin typeface="Helvetica"/>
+                <a:cs typeface="Helvetica"/>
+              </a:rPr>
+              <a:t>Implicature</a:t>
+            </a:r>
+            <a:endParaRPr lang="en-US" sz="1400" b="1" dirty="0">
+              <a:latin typeface="Helvetica"/>
+              <a:cs typeface="Helvetica"/>
+            </a:endParaRPr>
+          </a:p>
+        </p:txBody>
+      </p:sp>
+      <p:sp>
+        <p:nvSpPr>
+          <p:cNvPr id="12" name="TextBox 11"/>
+          <p:cNvSpPr txBox="1"/>
+          <p:nvPr/>
+        </p:nvSpPr>
+        <p:spPr>
+          <a:xfrm>
+            <a:off x="887036" y="4573595"/>
+            <a:ext cx="400110" cy="1274054"/>
+          </a:xfrm>
+          <a:prstGeom prst="rect">
+            <a:avLst/>
+          </a:prstGeom>
+          <a:noFill/>
+        </p:spPr>
+        <p:txBody>
+          <a:bodyPr vert="vert270" wrap="square" rtlCol="0">
+            <a:spAutoFit/>
+          </a:bodyPr>
+          <a:lstStyle/>
+          <a:p>
+            <a:pPr algn="ctr"/>
+            <a:r>
+              <a:rPr lang="en-US" sz="1400" b="1" dirty="0" smtClean="0">
+                <a:latin typeface="Helvetica"/>
+                <a:cs typeface="Helvetica"/>
+              </a:rPr>
+              <a:t>Negation</a:t>
+            </a:r>
+            <a:endParaRPr lang="en-US" sz="1400" b="1" dirty="0">
+              <a:latin typeface="Helvetica"/>
+              <a:cs typeface="Helvetica"/>
+            </a:endParaRPr>
+          </a:p>
+        </p:txBody>
+      </p:sp>
       <p:pic>
         <p:nvPicPr>
-          <p:cNvPr id="15" name="Picture 14" descr="parvis-1.png"/>
+          <p:cNvPr id="18" name="Picture 17" descr="parvis-1.png"/>
           <p:cNvPicPr>
             <a:picLocks noChangeAspect="1"/>
           </p:cNvPicPr>
@@ -3071,30 +3300,107 @@
         </p:nvPicPr>
         <p:blipFill>
           <a:blip r:embed="rId2"/>
-          <a:srcRect l="20795" t="1875" r="21136" b="1607"/>
           <a:stretch>
             <a:fillRect/>
           </a:stretch>
         </p:blipFill>
         <p:spPr>
           <a:xfrm>
-            <a:off x="908910" y="426484"/>
-            <a:ext cx="5309966" cy="5617108"/>
+            <a:off x="1203416" y="1328113"/>
+            <a:ext cx="7766503" cy="4854064"/>
           </a:xfrm>
           <a:prstGeom prst="rect">
             <a:avLst/>
           </a:prstGeom>
         </p:spPr>
       </p:pic>
-      <p:sp>
-        <p:nvSpPr>
-          <p:cNvPr id="6" name="TextBox 5"/>
+      <p:grpSp>
+        <p:nvGrpSpPr>
+          <p:cNvPr id="16" name="Group 15"/>
+          <p:cNvGrpSpPr/>
+          <p:nvPr/>
+        </p:nvGrpSpPr>
+        <p:grpSpPr>
+          <a:xfrm>
+            <a:off x="8107801" y="1341359"/>
+            <a:ext cx="1001668" cy="766928"/>
+            <a:chOff x="5386642" y="420489"/>
+            <a:chExt cx="1001668" cy="766928"/>
+          </a:xfrm>
+        </p:grpSpPr>
+        <p:pic>
+          <p:nvPicPr>
+            <p:cNvPr id="14" name="Picture 13" descr="viszoom-3.png"/>
+            <p:cNvPicPr>
+              <a:picLocks noChangeAspect="1"/>
+            </p:cNvPicPr>
+            <p:nvPr/>
+          </p:nvPicPr>
+          <p:blipFill>
+            <a:blip r:embed="rId3"/>
+            <a:srcRect l="71250" t="32500" r="9375" b="43750"/>
+            <a:stretch>
+              <a:fillRect/>
+            </a:stretch>
+          </p:blipFill>
+          <p:spPr>
+            <a:xfrm>
+              <a:off x="5455590" y="515091"/>
+              <a:ext cx="731633" cy="672326"/>
+            </a:xfrm>
+            <a:prstGeom prst="rect">
+              <a:avLst/>
+            </a:prstGeom>
+          </p:spPr>
+        </p:pic>
+        <p:sp>
+          <p:nvSpPr>
+            <p:cNvPr id="13" name="TextBox 12"/>
+            <p:cNvSpPr txBox="1"/>
+            <p:nvPr/>
+          </p:nvSpPr>
+          <p:spPr>
+            <a:xfrm>
+              <a:off x="5386642" y="420489"/>
+              <a:ext cx="1001668" cy="276999"/>
+            </a:xfrm>
+            <a:prstGeom prst="rect">
+              <a:avLst/>
+            </a:prstGeom>
+            <a:solidFill>
+              <a:srgbClr val="FFFFFF"/>
+            </a:solidFill>
+          </p:spPr>
+          <p:txBody>
+            <a:bodyPr vert="horz" wrap="square" rtlCol="0">
+              <a:noAutofit/>
+            </a:bodyPr>
+            <a:lstStyle/>
+            <a:p>
+              <a:r>
+                <a:rPr lang="en-US" sz="1200" b="1" dirty="0" smtClean="0">
+                  <a:latin typeface="Helvetica"/>
+                  <a:cs typeface="Helvetica"/>
+                </a:rPr>
+                <a:t>Trial Type:  </a:t>
+              </a:r>
+              <a:endParaRPr lang="en-US" sz="1200" b="1" dirty="0">
+                <a:latin typeface="Helvetica"/>
+                <a:cs typeface="Helvetica"/>
+              </a:endParaRPr>
+            </a:p>
+          </p:txBody>
+        </p:sp>
+      </p:grpSp>
+      <p:sp>
+        <p:nvSpPr>
+          <p:cNvPr id="19" name="TextBox 18"/>
           <p:cNvSpPr txBox="1"/>
           <p:nvPr/>
         </p:nvSpPr>
         <p:spPr>
           <a:xfrm>
-            <a:off x="1187945" y="118707"/>
+            <a:off x="7624524" y="1039373"/>
             <a:ext cx="1255948" cy="307777"/>
           </a:xfrm>
           <a:prstGeom prst="rect">
@@ -3110,268 +3416,13 @@
           <a:p>
             <a:pPr algn="ctr"/>
             <a:r>
-              <a:rPr lang="en-US" sz="1400" dirty="0" smtClean="0">
+              <a:rPr lang="en-US" sz="1400" b="1" dirty="0" smtClean="0">
                 <a:latin typeface="Helvetica"/>
                 <a:cs typeface="Helvetica"/>
               </a:rPr>
-              <a:t>4-year-olds</a:t>
-            </a:r>
-            <a:endParaRPr lang="en-US" sz="1400" dirty="0">
-              <a:latin typeface="Helvetica"/>
-              <a:cs typeface="Helvetica"/>
-            </a:endParaRPr>
-          </a:p>
-        </p:txBody>
-      </p:sp>
-      <p:sp>
-        <p:nvSpPr>
-          <p:cNvPr id="8" name="TextBox 7"/>
-          <p:cNvSpPr txBox="1"/>
-          <p:nvPr/>
-        </p:nvSpPr>
-        <p:spPr>
-          <a:xfrm>
-            <a:off x="3019074" y="118707"/>
-            <a:ext cx="1255948" cy="307777"/>
-          </a:xfrm>
-          <a:prstGeom prst="rect">
-            <a:avLst/>
-          </a:prstGeom>
-          <a:noFill/>
-        </p:spPr>
-        <p:txBody>
-          <a:bodyPr wrap="square" rtlCol="0">
-            <a:spAutoFit/>
-          </a:bodyPr>
-          <a:lstStyle/>
-          <a:p>
-            <a:pPr algn="ctr"/>
-            <a:r>
-              <a:rPr lang="en-US" sz="1400" dirty="0" smtClean="0">
-                <a:latin typeface="Helvetica"/>
-                <a:cs typeface="Helvetica"/>
-              </a:rPr>
-              <a:t>5-year-olds</a:t>
-            </a:r>
-            <a:endParaRPr lang="en-US" sz="1400" dirty="0">
-              <a:latin typeface="Helvetica"/>
-              <a:cs typeface="Helvetica"/>
-            </a:endParaRPr>
-          </a:p>
-        </p:txBody>
-      </p:sp>
-      <p:sp>
-        <p:nvSpPr>
-          <p:cNvPr id="9" name="TextBox 8"/>
-          <p:cNvSpPr txBox="1"/>
-          <p:nvPr/>
-        </p:nvSpPr>
-        <p:spPr>
-          <a:xfrm>
-            <a:off x="4850203" y="118707"/>
-            <a:ext cx="1255948" cy="307777"/>
-          </a:xfrm>
-          <a:prstGeom prst="rect">
-            <a:avLst/>
-          </a:prstGeom>
-          <a:noFill/>
-        </p:spPr>
-        <p:txBody>
-          <a:bodyPr wrap="square" rtlCol="0">
-            <a:spAutoFit/>
-          </a:bodyPr>
-          <a:lstStyle/>
-          <a:p>
-            <a:pPr algn="ctr"/>
-            <a:r>
-              <a:rPr lang="en-US" sz="1400" dirty="0">
-                <a:latin typeface="Helvetica"/>
-                <a:cs typeface="Helvetica"/>
-              </a:rPr>
-              <a:t>6</a:t>
-            </a:r>
-            <a:r>
-              <a:rPr lang="en-US" sz="1400" dirty="0" smtClean="0">
-                <a:latin typeface="Helvetica"/>
-                <a:cs typeface="Helvetica"/>
-              </a:rPr>
-              <a:t>-year-olds</a:t>
-            </a:r>
-            <a:endParaRPr lang="en-US" sz="1400" dirty="0">
-              <a:latin typeface="Helvetica"/>
-              <a:cs typeface="Helvetica"/>
-            </a:endParaRPr>
-          </a:p>
-        </p:txBody>
-      </p:sp>
-      <p:sp>
-        <p:nvSpPr>
-          <p:cNvPr id="10" name="TextBox 9"/>
-          <p:cNvSpPr txBox="1"/>
-          <p:nvPr/>
-        </p:nvSpPr>
-        <p:spPr>
-          <a:xfrm>
-            <a:off x="536710" y="555621"/>
-            <a:ext cx="400110" cy="1274054"/>
-          </a:xfrm>
-          <a:prstGeom prst="rect">
-            <a:avLst/>
-          </a:prstGeom>
-          <a:noFill/>
-        </p:spPr>
-        <p:txBody>
-          <a:bodyPr vert="vert270" wrap="square" rtlCol="0">
-            <a:spAutoFit/>
-          </a:bodyPr>
-          <a:lstStyle/>
-          <a:p>
-            <a:pPr algn="ctr"/>
-            <a:r>
-              <a:rPr lang="en-US" sz="1400" dirty="0" smtClean="0">
-                <a:latin typeface="Helvetica"/>
-                <a:cs typeface="Helvetica"/>
-              </a:rPr>
-              <a:t>Inhibition</a:t>
-            </a:r>
-            <a:endParaRPr lang="en-US" sz="1400" dirty="0">
-              <a:latin typeface="Helvetica"/>
-              <a:cs typeface="Helvetica"/>
-            </a:endParaRPr>
-          </a:p>
-        </p:txBody>
-      </p:sp>
-      <p:sp>
-        <p:nvSpPr>
-          <p:cNvPr id="11" name="TextBox 10"/>
-          <p:cNvSpPr txBox="1"/>
-          <p:nvPr/>
-        </p:nvSpPr>
-        <p:spPr>
-          <a:xfrm>
-            <a:off x="536710" y="2481091"/>
-            <a:ext cx="400110" cy="1274054"/>
-          </a:xfrm>
-          <a:prstGeom prst="rect">
-            <a:avLst/>
-          </a:prstGeom>
-          <a:noFill/>
-        </p:spPr>
-        <p:txBody>
-          <a:bodyPr vert="vert270" wrap="square" rtlCol="0">
-            <a:spAutoFit/>
-          </a:bodyPr>
-          <a:lstStyle/>
-          <a:p>
-            <a:pPr algn="ctr"/>
-            <a:r>
-              <a:rPr lang="en-US" sz="1400" dirty="0" err="1" smtClean="0">
-                <a:latin typeface="Helvetica"/>
-                <a:cs typeface="Helvetica"/>
-              </a:rPr>
-              <a:t>Implicature</a:t>
-            </a:r>
-            <a:endParaRPr lang="en-US" sz="1400" dirty="0">
-              <a:latin typeface="Helvetica"/>
-              <a:cs typeface="Helvetica"/>
-            </a:endParaRPr>
-          </a:p>
-        </p:txBody>
-      </p:sp>
-      <p:sp>
-        <p:nvSpPr>
-          <p:cNvPr id="12" name="TextBox 11"/>
-          <p:cNvSpPr txBox="1"/>
-          <p:nvPr/>
-        </p:nvSpPr>
-        <p:spPr>
-          <a:xfrm>
-            <a:off x="536710" y="4420071"/>
-            <a:ext cx="400110" cy="1274054"/>
-          </a:xfrm>
-          <a:prstGeom prst="rect">
-            <a:avLst/>
-          </a:prstGeom>
-          <a:noFill/>
-        </p:spPr>
-        <p:txBody>
-          <a:bodyPr vert="vert270" wrap="square" rtlCol="0">
-            <a:spAutoFit/>
-          </a:bodyPr>
-          <a:lstStyle/>
-          <a:p>
-            <a:pPr algn="ctr"/>
-            <a:r>
-              <a:rPr lang="en-US" sz="1400" dirty="0" smtClean="0">
-                <a:latin typeface="Helvetica"/>
-                <a:cs typeface="Helvetica"/>
-              </a:rPr>
-              <a:t>Negation</a:t>
-            </a:r>
-            <a:endParaRPr lang="en-US" sz="1400" dirty="0">
-              <a:latin typeface="Helvetica"/>
-              <a:cs typeface="Helvetica"/>
-            </a:endParaRPr>
-          </a:p>
-        </p:txBody>
-      </p:sp>
-      <p:pic>
-        <p:nvPicPr>
-          <p:cNvPr id="14" name="Picture 13" descr="viszoom-3.png"/>
-          <p:cNvPicPr>
-            <a:picLocks noChangeAspect="1"/>
-          </p:cNvPicPr>
-          <p:nvPr/>
-        </p:nvPicPr>
-        <p:blipFill>
-          <a:blip r:embed="rId3"/>
-          <a:srcRect l="71250" t="32500" r="9375" b="43750"/>
-          <a:stretch>
-            <a:fillRect/>
-          </a:stretch>
-        </p:blipFill>
-        <p:spPr>
-          <a:xfrm>
-            <a:off x="5455590" y="515091"/>
-            <a:ext cx="731633" cy="672326"/>
-          </a:xfrm>
-          <a:prstGeom prst="rect">
-            <a:avLst/>
-          </a:prstGeom>
-        </p:spPr>
-      </p:pic>
-      <p:sp>
-        <p:nvSpPr>
-          <p:cNvPr id="13" name="TextBox 12"/>
-          <p:cNvSpPr txBox="1"/>
-          <p:nvPr/>
-        </p:nvSpPr>
-        <p:spPr>
-          <a:xfrm>
-            <a:off x="5414552" y="420489"/>
-            <a:ext cx="1001668" cy="276999"/>
-          </a:xfrm>
-          <a:prstGeom prst="rect">
-            <a:avLst/>
-          </a:prstGeom>
-          <a:solidFill>
-            <a:srgbClr val="FFFFFF"/>
-          </a:solidFill>
-        </p:spPr>
-        <p:txBody>
-          <a:bodyPr vert="horz" wrap="square" rtlCol="0">
-            <a:spAutoFit/>
-          </a:bodyPr>
-          <a:lstStyle/>
-          <a:p>
-            <a:r>
-              <a:rPr lang="en-US" sz="1200" b="1" dirty="0" smtClean="0">
-                <a:latin typeface="Helvetica"/>
-                <a:cs typeface="Helvetica"/>
-              </a:rPr>
-              <a:t>Trial Type:  </a:t>
-            </a:r>
-            <a:endParaRPr lang="en-US" sz="1200" b="1" dirty="0">
+              <a:t>Adults</a:t>
+            </a:r>
+            <a:endParaRPr lang="en-US" sz="1400" b="1" dirty="0">
               <a:latin typeface="Helvetica"/>
               <a:cs typeface="Helvetica"/>
             </a:endParaRPr>

</xml_diff>